<commit_message>
correcao do enunciado da pg 53.
</commit_message>
<xml_diff>
--- a/slides.pptx
+++ b/slides.pptx
@@ -5,7 +5,7 @@
     <p:sldMasterId id="2147483648" r:id="rId1"/>
   </p:sldMasterIdLst>
   <p:notesMasterIdLst>
-    <p:notesMasterId r:id="rId53"/>
+    <p:notesMasterId r:id="rId56"/>
   </p:notesMasterIdLst>
   <p:sldIdLst>
     <p:sldId id="256" r:id="rId2"/>
@@ -59,6 +59,9 @@
     <p:sldId id="305" r:id="rId50"/>
     <p:sldId id="306" r:id="rId51"/>
     <p:sldId id="307" r:id="rId52"/>
+    <p:sldId id="308" r:id="rId53"/>
+    <p:sldId id="309" r:id="rId54"/>
+    <p:sldId id="310" r:id="rId55"/>
   </p:sldIdLst>
   <p:sldSz cx="12192000" cy="6858000"/>
   <p:notesSz cx="6858000" cy="9144000"/>
@@ -24554,6 +24557,809 @@
 </p:sld>
 </file>
 
+<file path=ppt/slides/slide52.xml><?xml version="1.0" encoding="utf-8"?>
+<p:sld xmlns:a="http://schemas.openxmlformats.org/drawingml/2006/main" xmlns:r="http://schemas.openxmlformats.org/officeDocument/2006/relationships" xmlns:p="http://schemas.openxmlformats.org/presentationml/2006/main">
+  <p:cSld>
+    <p:spTree>
+      <p:nvGrpSpPr>
+        <p:cNvPr id="1" name=""/>
+        <p:cNvGrpSpPr/>
+        <p:nvPr/>
+      </p:nvGrpSpPr>
+      <p:grpSpPr>
+        <a:xfrm>
+          <a:off x="0" y="0"/>
+          <a:ext cx="0" cy="0"/>
+          <a:chOff x="0" y="0"/>
+          <a:chExt cx="0" cy="0"/>
+        </a:xfrm>
+      </p:grpSpPr>
+      <p:sp>
+        <p:nvSpPr>
+          <p:cNvPr id="2" name="Título 1">
+            <a:extLst>
+              <a:ext uri="{FF2B5EF4-FFF2-40B4-BE49-F238E27FC236}">
+                <a16:creationId xmlns:a16="http://schemas.microsoft.com/office/drawing/2014/main" id="{AC861865-1FD7-784B-B3BA-CF0058ADECC6}"/>
+              </a:ext>
+            </a:extLst>
+          </p:cNvPr>
+          <p:cNvSpPr>
+            <a:spLocks noGrp="1"/>
+          </p:cNvSpPr>
+          <p:nvPr>
+            <p:ph type="title"/>
+          </p:nvPr>
+        </p:nvSpPr>
+        <p:spPr/>
+        <p:txBody>
+          <a:bodyPr/>
+          <a:lstStyle/>
+          <a:p>
+            <a:r>
+              <a:rPr lang="pt-BR" dirty="0"/>
+              <a:t>Expressões Regulares AFD/DFA e AFN/NFA</a:t>
+            </a:r>
+          </a:p>
+        </p:txBody>
+      </p:sp>
+      <p:sp>
+        <p:nvSpPr>
+          <p:cNvPr id="3" name="Espaço Reservado para Conteúdo 2">
+            <a:extLst>
+              <a:ext uri="{FF2B5EF4-FFF2-40B4-BE49-F238E27FC236}">
+                <a16:creationId xmlns:a16="http://schemas.microsoft.com/office/drawing/2014/main" id="{9A6E356A-F799-E049-883E-110976F7DCDE}"/>
+              </a:ext>
+            </a:extLst>
+          </p:cNvPr>
+          <p:cNvSpPr>
+            <a:spLocks noGrp="1"/>
+          </p:cNvSpPr>
+          <p:nvPr>
+            <p:ph idx="1"/>
+          </p:nvPr>
+        </p:nvSpPr>
+        <p:spPr/>
+        <p:txBody>
+          <a:bodyPr/>
+          <a:lstStyle/>
+          <a:p>
+            <a:r>
+              <a:rPr lang="pt-BR" dirty="0"/>
+              <a:t>Ambos os tipos de autômatos podem ser utilizados para representar uma expressão regular.</a:t>
+            </a:r>
+          </a:p>
+          <a:p>
+            <a:pPr lvl="1"/>
+            <a:r>
+              <a:rPr lang="pt-BR" dirty="0"/>
+              <a:t>Em geral </a:t>
+            </a:r>
+            <a:r>
+              <a:rPr lang="pt-BR" dirty="0" err="1"/>
+              <a:t>AFDs</a:t>
+            </a:r>
+            <a:r>
+              <a:rPr lang="pt-BR" dirty="0"/>
+              <a:t> são mais fáceis de simular do que AFN.</a:t>
+            </a:r>
+          </a:p>
+          <a:p>
+            <a:pPr lvl="1"/>
+            <a:endParaRPr lang="pt-BR" dirty="0"/>
+          </a:p>
+          <a:p>
+            <a:r>
+              <a:rPr lang="pt-BR" dirty="0"/>
+              <a:t>A conversão de uma AFN para uma AFD, porém, pode ser muito complexa, caso essa complexidade seja maior que a simulação do AFN, este último pode ser a escolha correta.</a:t>
+            </a:r>
+          </a:p>
+        </p:txBody>
+      </p:sp>
+      <p:sp>
+        <p:nvSpPr>
+          <p:cNvPr id="4" name="Espaço Reservado para Data 3">
+            <a:extLst>
+              <a:ext uri="{FF2B5EF4-FFF2-40B4-BE49-F238E27FC236}">
+                <a16:creationId xmlns:a16="http://schemas.microsoft.com/office/drawing/2014/main" id="{D37B31C5-0BA1-DB4B-9F8B-F1C33616FAAE}"/>
+              </a:ext>
+            </a:extLst>
+          </p:cNvPr>
+          <p:cNvSpPr>
+            <a:spLocks noGrp="1"/>
+          </p:cNvSpPr>
+          <p:nvPr>
+            <p:ph type="dt" sz="half" idx="10"/>
+          </p:nvPr>
+        </p:nvSpPr>
+        <p:spPr/>
+        <p:txBody>
+          <a:bodyPr/>
+          <a:lstStyle/>
+          <a:p>
+            <a:r>
+              <a:rPr lang="pt-BR"/>
+              <a:t>Compiladores</a:t>
+            </a:r>
+            <a:endParaRPr lang="pt-BR" dirty="0"/>
+          </a:p>
+        </p:txBody>
+      </p:sp>
+      <p:sp>
+        <p:nvSpPr>
+          <p:cNvPr id="5" name="Espaço Reservado para Rodapé 4">
+            <a:extLst>
+              <a:ext uri="{FF2B5EF4-FFF2-40B4-BE49-F238E27FC236}">
+                <a16:creationId xmlns:a16="http://schemas.microsoft.com/office/drawing/2014/main" id="{0C780D29-0D5D-3C43-BD0B-D370075061FF}"/>
+              </a:ext>
+            </a:extLst>
+          </p:cNvPr>
+          <p:cNvSpPr>
+            <a:spLocks noGrp="1"/>
+          </p:cNvSpPr>
+          <p:nvPr>
+            <p:ph type="ftr" sz="quarter" idx="11"/>
+          </p:nvPr>
+        </p:nvSpPr>
+        <p:spPr/>
+        <p:txBody>
+          <a:bodyPr/>
+          <a:lstStyle/>
+          <a:p>
+            <a:r>
+              <a:rPr lang="pt-BR"/>
+              <a:t>Prof. Mathias Santos de Brito</a:t>
+            </a:r>
+            <a:endParaRPr lang="pt-BR" dirty="0"/>
+          </a:p>
+        </p:txBody>
+      </p:sp>
+      <p:sp>
+        <p:nvSpPr>
+          <p:cNvPr id="6" name="Espaço Reservado para Número de Slide 5">
+            <a:extLst>
+              <a:ext uri="{FF2B5EF4-FFF2-40B4-BE49-F238E27FC236}">
+                <a16:creationId xmlns:a16="http://schemas.microsoft.com/office/drawing/2014/main" id="{7F091333-9054-534B-ACD9-9889DF0B442E}"/>
+              </a:ext>
+            </a:extLst>
+          </p:cNvPr>
+          <p:cNvSpPr>
+            <a:spLocks noGrp="1"/>
+          </p:cNvSpPr>
+          <p:nvPr>
+            <p:ph type="sldNum" sz="quarter" idx="12"/>
+          </p:nvPr>
+        </p:nvSpPr>
+        <p:spPr/>
+        <p:txBody>
+          <a:bodyPr/>
+          <a:lstStyle/>
+          <a:p>
+            <a:fld id="{BB6592E8-4CB6-CA48-8DDA-14B9D6C8BDBF}" type="slidenum">
+              <a:rPr lang="pt-BR" smtClean="0"/>
+              <a:t>52</a:t>
+            </a:fld>
+            <a:endParaRPr lang="pt-BR"/>
+          </a:p>
+        </p:txBody>
+      </p:sp>
+    </p:spTree>
+    <p:extLst>
+      <p:ext uri="{BB962C8B-B14F-4D97-AF65-F5344CB8AC3E}">
+        <p14:creationId xmlns:p14="http://schemas.microsoft.com/office/powerpoint/2010/main" val="2153695642"/>
+      </p:ext>
+    </p:extLst>
+  </p:cSld>
+  <p:clrMapOvr>
+    <a:masterClrMapping/>
+  </p:clrMapOvr>
+</p:sld>
+</file>
+
+<file path=ppt/slides/slide53.xml><?xml version="1.0" encoding="utf-8"?>
+<p:sld xmlns:a="http://schemas.openxmlformats.org/drawingml/2006/main" xmlns:r="http://schemas.openxmlformats.org/officeDocument/2006/relationships" xmlns:p="http://schemas.openxmlformats.org/presentationml/2006/main">
+  <p:cSld>
+    <p:spTree>
+      <p:nvGrpSpPr>
+        <p:cNvPr id="1" name=""/>
+        <p:cNvGrpSpPr/>
+        <p:nvPr/>
+      </p:nvGrpSpPr>
+      <p:grpSpPr>
+        <a:xfrm>
+          <a:off x="0" y="0"/>
+          <a:ext cx="0" cy="0"/>
+          <a:chOff x="0" y="0"/>
+          <a:chExt cx="0" cy="0"/>
+        </a:xfrm>
+      </p:grpSpPr>
+      <p:sp>
+        <p:nvSpPr>
+          <p:cNvPr id="2" name="Título 1">
+            <a:extLst>
+              <a:ext uri="{FF2B5EF4-FFF2-40B4-BE49-F238E27FC236}">
+                <a16:creationId xmlns:a16="http://schemas.microsoft.com/office/drawing/2014/main" id="{AB414F1F-51C1-F743-9B17-FA3A443A6A96}"/>
+              </a:ext>
+            </a:extLst>
+          </p:cNvPr>
+          <p:cNvSpPr>
+            <a:spLocks noGrp="1"/>
+          </p:cNvSpPr>
+          <p:nvPr>
+            <p:ph type="title"/>
+          </p:nvPr>
+        </p:nvSpPr>
+        <p:spPr/>
+        <p:txBody>
+          <a:bodyPr/>
+          <a:lstStyle/>
+          <a:p>
+            <a:r>
+              <a:rPr lang="pt-BR" dirty="0"/>
+              <a:t>Usando AFD</a:t>
+            </a:r>
+          </a:p>
+        </p:txBody>
+      </p:sp>
+      <mc:AlternateContent xmlns:mc="http://schemas.openxmlformats.org/markup-compatibility/2006">
+        <mc:Choice xmlns:a14="http://schemas.microsoft.com/office/drawing/2010/main" Requires="a14">
+          <p:sp>
+            <p:nvSpPr>
+              <p:cNvPr id="3" name="Espaço Reservado para Conteúdo 2">
+                <a:extLst>
+                  <a:ext uri="{FF2B5EF4-FFF2-40B4-BE49-F238E27FC236}">
+                    <a16:creationId xmlns:a16="http://schemas.microsoft.com/office/drawing/2014/main" id="{BA968348-D355-C944-9C9A-A2FEB480A346}"/>
+                  </a:ext>
+                </a:extLst>
+              </p:cNvPr>
+              <p:cNvSpPr>
+                <a:spLocks noGrp="1"/>
+              </p:cNvSpPr>
+              <p:nvPr>
+                <p:ph idx="1"/>
+              </p:nvPr>
+            </p:nvSpPr>
+            <p:spPr/>
+            <p:txBody>
+              <a:bodyPr/>
+              <a:lstStyle/>
+              <a:p>
+                <a:r>
+                  <a:rPr lang="pt-BR" dirty="0"/>
+                  <a:t>Crie um AFD que aceite a linguagem </a:t>
+                </a:r>
+                <a14:m>
+                  <m:oMath xmlns:m="http://schemas.openxmlformats.org/officeDocument/2006/math">
+                    <m:sSup>
+                      <m:sSupPr>
+                        <m:ctrlPr>
+                          <a:rPr lang="en-US" b="0" i="1" smtClean="0">
+                            <a:latin typeface="Cambria Math" panose="02040503050406030204" pitchFamily="18" charset="0"/>
+                          </a:rPr>
+                        </m:ctrlPr>
+                      </m:sSupPr>
+                      <m:e>
+                        <m:d>
+                          <m:dPr>
+                            <m:ctrlPr>
+                              <a:rPr lang="en-US" i="1">
+                                <a:latin typeface="Cambria Math" panose="02040503050406030204" pitchFamily="18" charset="0"/>
+                              </a:rPr>
+                            </m:ctrlPr>
+                          </m:dPr>
+                          <m:e>
+                            <m:r>
+                              <a:rPr lang="en-US" i="1">
+                                <a:latin typeface="Cambria Math" panose="02040503050406030204" pitchFamily="18" charset="0"/>
+                              </a:rPr>
+                              <m:t>𝑎</m:t>
+                            </m:r>
+                          </m:e>
+                          <m:e>
+                            <m:r>
+                              <a:rPr lang="en-US" i="1">
+                                <a:latin typeface="Cambria Math" panose="02040503050406030204" pitchFamily="18" charset="0"/>
+                              </a:rPr>
+                              <m:t>𝑏</m:t>
+                            </m:r>
+                          </m:e>
+                        </m:d>
+                      </m:e>
+                      <m:sup>
+                        <m:r>
+                          <a:rPr lang="en-US" b="0" i="1" smtClean="0">
+                            <a:latin typeface="Cambria Math" panose="02040503050406030204" pitchFamily="18" charset="0"/>
+                          </a:rPr>
+                          <m:t>∗</m:t>
+                        </m:r>
+                      </m:sup>
+                    </m:sSup>
+                    <m:r>
+                      <a:rPr lang="en-US" b="0" i="1" smtClean="0">
+                        <a:latin typeface="Cambria Math" panose="02040503050406030204" pitchFamily="18" charset="0"/>
+                      </a:rPr>
+                      <m:t>𝑎𝑏𝑏</m:t>
+                    </m:r>
+                  </m:oMath>
+                </a14:m>
+                <a:endParaRPr lang="en-US" b="0" dirty="0"/>
+              </a:p>
+              <a:p>
+                <a:endParaRPr lang="pt-BR" dirty="0"/>
+              </a:p>
+              <a:p>
+                <a:endParaRPr lang="pt-BR" dirty="0"/>
+              </a:p>
+            </p:txBody>
+          </p:sp>
+        </mc:Choice>
+        <mc:Fallback>
+          <p:sp>
+            <p:nvSpPr>
+              <p:cNvPr id="3" name="Espaço Reservado para Conteúdo 2">
+                <a:extLst>
+                  <a:ext uri="{FF2B5EF4-FFF2-40B4-BE49-F238E27FC236}">
+                    <a16:creationId xmlns:a16="http://schemas.microsoft.com/office/drawing/2014/main" id="{BA968348-D355-C944-9C9A-A2FEB480A346}"/>
+                  </a:ext>
+                </a:extLst>
+              </p:cNvPr>
+              <p:cNvSpPr>
+                <a:spLocks noGrp="1" noRot="1" noChangeAspect="1" noMove="1" noResize="1" noEditPoints="1" noAdjustHandles="1" noChangeArrowheads="1" noChangeShapeType="1" noTextEdit="1"/>
+              </p:cNvSpPr>
+              <p:nvPr>
+                <p:ph idx="1"/>
+              </p:nvPr>
+            </p:nvSpPr>
+            <p:spPr>
+              <a:blipFill>
+                <a:blip r:embed="rId2"/>
+                <a:stretch>
+                  <a:fillRect l="-965" t="-2632"/>
+                </a:stretch>
+              </a:blipFill>
+            </p:spPr>
+            <p:txBody>
+              <a:bodyPr/>
+              <a:lstStyle/>
+              <a:p>
+                <a:r>
+                  <a:rPr lang="pt-BR">
+                    <a:noFill/>
+                  </a:rPr>
+                  <a:t> </a:t>
+                </a:r>
+              </a:p>
+            </p:txBody>
+          </p:sp>
+        </mc:Fallback>
+      </mc:AlternateContent>
+      <p:sp>
+        <p:nvSpPr>
+          <p:cNvPr id="4" name="Espaço Reservado para Data 3">
+            <a:extLst>
+              <a:ext uri="{FF2B5EF4-FFF2-40B4-BE49-F238E27FC236}">
+                <a16:creationId xmlns:a16="http://schemas.microsoft.com/office/drawing/2014/main" id="{5E13B970-6545-2345-98E4-79A0DD36C444}"/>
+              </a:ext>
+            </a:extLst>
+          </p:cNvPr>
+          <p:cNvSpPr>
+            <a:spLocks noGrp="1"/>
+          </p:cNvSpPr>
+          <p:nvPr>
+            <p:ph type="dt" sz="half" idx="10"/>
+          </p:nvPr>
+        </p:nvSpPr>
+        <p:spPr/>
+        <p:txBody>
+          <a:bodyPr/>
+          <a:lstStyle/>
+          <a:p>
+            <a:r>
+              <a:rPr lang="pt-BR"/>
+              <a:t>Compiladores</a:t>
+            </a:r>
+            <a:endParaRPr lang="pt-BR" dirty="0"/>
+          </a:p>
+        </p:txBody>
+      </p:sp>
+      <p:sp>
+        <p:nvSpPr>
+          <p:cNvPr id="5" name="Espaço Reservado para Rodapé 4">
+            <a:extLst>
+              <a:ext uri="{FF2B5EF4-FFF2-40B4-BE49-F238E27FC236}">
+                <a16:creationId xmlns:a16="http://schemas.microsoft.com/office/drawing/2014/main" id="{3AFD8C2A-3513-5F47-8D47-BD8219E564A8}"/>
+              </a:ext>
+            </a:extLst>
+          </p:cNvPr>
+          <p:cNvSpPr>
+            <a:spLocks noGrp="1"/>
+          </p:cNvSpPr>
+          <p:nvPr>
+            <p:ph type="ftr" sz="quarter" idx="11"/>
+          </p:nvPr>
+        </p:nvSpPr>
+        <p:spPr/>
+        <p:txBody>
+          <a:bodyPr/>
+          <a:lstStyle/>
+          <a:p>
+            <a:r>
+              <a:rPr lang="pt-BR"/>
+              <a:t>Prof. Mathias Santos de Brito</a:t>
+            </a:r>
+            <a:endParaRPr lang="pt-BR" dirty="0"/>
+          </a:p>
+        </p:txBody>
+      </p:sp>
+      <p:sp>
+        <p:nvSpPr>
+          <p:cNvPr id="6" name="Espaço Reservado para Número de Slide 5">
+            <a:extLst>
+              <a:ext uri="{FF2B5EF4-FFF2-40B4-BE49-F238E27FC236}">
+                <a16:creationId xmlns:a16="http://schemas.microsoft.com/office/drawing/2014/main" id="{D1B671D3-446A-744A-AC64-95C333BDB693}"/>
+              </a:ext>
+            </a:extLst>
+          </p:cNvPr>
+          <p:cNvSpPr>
+            <a:spLocks noGrp="1"/>
+          </p:cNvSpPr>
+          <p:nvPr>
+            <p:ph type="sldNum" sz="quarter" idx="12"/>
+          </p:nvPr>
+        </p:nvSpPr>
+        <p:spPr/>
+        <p:txBody>
+          <a:bodyPr/>
+          <a:lstStyle/>
+          <a:p>
+            <a:fld id="{BB6592E8-4CB6-CA48-8DDA-14B9D6C8BDBF}" type="slidenum">
+              <a:rPr lang="pt-BR" smtClean="0"/>
+              <a:t>53</a:t>
+            </a:fld>
+            <a:endParaRPr lang="pt-BR"/>
+          </a:p>
+        </p:txBody>
+      </p:sp>
+      <p:pic>
+        <p:nvPicPr>
+          <p:cNvPr id="8" name="Imagem 7">
+            <a:extLst>
+              <a:ext uri="{FF2B5EF4-FFF2-40B4-BE49-F238E27FC236}">
+                <a16:creationId xmlns:a16="http://schemas.microsoft.com/office/drawing/2014/main" id="{3A864623-2395-1248-B3BB-0F6BF0773EB7}"/>
+              </a:ext>
+            </a:extLst>
+          </p:cNvPr>
+          <p:cNvPicPr>
+            <a:picLocks noChangeAspect="1"/>
+          </p:cNvPicPr>
+          <p:nvPr/>
+        </p:nvPicPr>
+        <p:blipFill rotWithShape="1">
+          <a:blip r:embed="rId3"/>
+          <a:srcRect t="53852" r="1741"/>
+          <a:stretch/>
+        </p:blipFill>
+        <p:spPr>
+          <a:xfrm>
+            <a:off x="2852283" y="2886543"/>
+            <a:ext cx="6367035" cy="2806889"/>
+          </a:xfrm>
+          <a:prstGeom prst="rect">
+            <a:avLst/>
+          </a:prstGeom>
+        </p:spPr>
+      </p:pic>
+    </p:spTree>
+    <p:extLst>
+      <p:ext uri="{BB962C8B-B14F-4D97-AF65-F5344CB8AC3E}">
+        <p14:creationId xmlns:p14="http://schemas.microsoft.com/office/powerpoint/2010/main" val="859475960"/>
+      </p:ext>
+    </p:extLst>
+  </p:cSld>
+  <p:clrMapOvr>
+    <a:masterClrMapping/>
+  </p:clrMapOvr>
+  <p:timing>
+    <p:tnLst>
+      <p:par>
+        <p:cTn id="1" dur="indefinite" restart="never" nodeType="tmRoot">
+          <p:childTnLst>
+            <p:seq concurrent="1" nextAc="seek">
+              <p:cTn id="2" dur="indefinite" nodeType="mainSeq">
+                <p:childTnLst>
+                  <p:par>
+                    <p:cTn id="3" fill="hold">
+                      <p:stCondLst>
+                        <p:cond delay="indefinite"/>
+                      </p:stCondLst>
+                      <p:childTnLst>
+                        <p:par>
+                          <p:cTn id="4" fill="hold">
+                            <p:stCondLst>
+                              <p:cond delay="0"/>
+                            </p:stCondLst>
+                            <p:childTnLst>
+                              <p:par>
+                                <p:cTn id="5" presetID="2" presetClass="entr" presetSubtype="4" fill="hold" nodeType="clickEffect">
+                                  <p:stCondLst>
+                                    <p:cond delay="0"/>
+                                  </p:stCondLst>
+                                  <p:childTnLst>
+                                    <p:set>
+                                      <p:cBhvr>
+                                        <p:cTn id="6" dur="1" fill="hold">
+                                          <p:stCondLst>
+                                            <p:cond delay="0"/>
+                                          </p:stCondLst>
+                                        </p:cTn>
+                                        <p:tgtEl>
+                                          <p:spTgt spid="8"/>
+                                        </p:tgtEl>
+                                        <p:attrNameLst>
+                                          <p:attrName>style.visibility</p:attrName>
+                                        </p:attrNameLst>
+                                      </p:cBhvr>
+                                      <p:to>
+                                        <p:strVal val="visible"/>
+                                      </p:to>
+                                    </p:set>
+                                    <p:anim calcmode="lin" valueType="num">
+                                      <p:cBhvr additive="base">
+                                        <p:cTn id="7" dur="500" fill="hold"/>
+                                        <p:tgtEl>
+                                          <p:spTgt spid="8"/>
+                                        </p:tgtEl>
+                                        <p:attrNameLst>
+                                          <p:attrName>ppt_x</p:attrName>
+                                        </p:attrNameLst>
+                                      </p:cBhvr>
+                                      <p:tavLst>
+                                        <p:tav tm="0">
+                                          <p:val>
+                                            <p:strVal val="#ppt_x"/>
+                                          </p:val>
+                                        </p:tav>
+                                        <p:tav tm="100000">
+                                          <p:val>
+                                            <p:strVal val="#ppt_x"/>
+                                          </p:val>
+                                        </p:tav>
+                                      </p:tavLst>
+                                    </p:anim>
+                                    <p:anim calcmode="lin" valueType="num">
+                                      <p:cBhvr additive="base">
+                                        <p:cTn id="8" dur="500" fill="hold"/>
+                                        <p:tgtEl>
+                                          <p:spTgt spid="8"/>
+                                        </p:tgtEl>
+                                        <p:attrNameLst>
+                                          <p:attrName>ppt_y</p:attrName>
+                                        </p:attrNameLst>
+                                      </p:cBhvr>
+                                      <p:tavLst>
+                                        <p:tav tm="0">
+                                          <p:val>
+                                            <p:strVal val="1+#ppt_h/2"/>
+                                          </p:val>
+                                        </p:tav>
+                                        <p:tav tm="100000">
+                                          <p:val>
+                                            <p:strVal val="#ppt_y"/>
+                                          </p:val>
+                                        </p:tav>
+                                      </p:tavLst>
+                                    </p:anim>
+                                  </p:childTnLst>
+                                </p:cTn>
+                              </p:par>
+                            </p:childTnLst>
+                          </p:cTn>
+                        </p:par>
+                      </p:childTnLst>
+                    </p:cTn>
+                  </p:par>
+                </p:childTnLst>
+              </p:cTn>
+              <p:prevCondLst>
+                <p:cond evt="onPrev" delay="0">
+                  <p:tgtEl>
+                    <p:sldTgt/>
+                  </p:tgtEl>
+                </p:cond>
+              </p:prevCondLst>
+              <p:nextCondLst>
+                <p:cond evt="onNext" delay="0">
+                  <p:tgtEl>
+                    <p:sldTgt/>
+                  </p:tgtEl>
+                </p:cond>
+              </p:nextCondLst>
+            </p:seq>
+          </p:childTnLst>
+        </p:cTn>
+      </p:par>
+    </p:tnLst>
+  </p:timing>
+</p:sld>
+</file>
+
+<file path=ppt/slides/slide54.xml><?xml version="1.0" encoding="utf-8"?>
+<p:sld xmlns:a="http://schemas.openxmlformats.org/drawingml/2006/main" xmlns:r="http://schemas.openxmlformats.org/officeDocument/2006/relationships" xmlns:p="http://schemas.openxmlformats.org/presentationml/2006/main">
+  <p:cSld>
+    <p:spTree>
+      <p:nvGrpSpPr>
+        <p:cNvPr id="1" name=""/>
+        <p:cNvGrpSpPr/>
+        <p:nvPr/>
+      </p:nvGrpSpPr>
+      <p:grpSpPr>
+        <a:xfrm>
+          <a:off x="0" y="0"/>
+          <a:ext cx="0" cy="0"/>
+          <a:chOff x="0" y="0"/>
+          <a:chExt cx="0" cy="0"/>
+        </a:xfrm>
+      </p:grpSpPr>
+      <p:sp>
+        <p:nvSpPr>
+          <p:cNvPr id="2" name="Título 1">
+            <a:extLst>
+              <a:ext uri="{FF2B5EF4-FFF2-40B4-BE49-F238E27FC236}">
+                <a16:creationId xmlns:a16="http://schemas.microsoft.com/office/drawing/2014/main" id="{5979C988-406B-A747-AA1B-C8110644B638}"/>
+              </a:ext>
+            </a:extLst>
+          </p:cNvPr>
+          <p:cNvSpPr>
+            <a:spLocks noGrp="1"/>
+          </p:cNvSpPr>
+          <p:nvPr>
+            <p:ph type="title"/>
+          </p:nvPr>
+        </p:nvSpPr>
+        <p:spPr/>
+        <p:txBody>
+          <a:bodyPr/>
+          <a:lstStyle/>
+          <a:p>
+            <a:r>
+              <a:rPr lang="pt-BR" dirty="0"/>
+              <a:t>Usando AFD</a:t>
+            </a:r>
+          </a:p>
+        </p:txBody>
+      </p:sp>
+      <p:sp>
+        <p:nvSpPr>
+          <p:cNvPr id="3" name="Espaço Reservado para Conteúdo 2">
+            <a:extLst>
+              <a:ext uri="{FF2B5EF4-FFF2-40B4-BE49-F238E27FC236}">
+                <a16:creationId xmlns:a16="http://schemas.microsoft.com/office/drawing/2014/main" id="{FF64B3BC-8630-7142-8FE9-86E572670870}"/>
+              </a:ext>
+            </a:extLst>
+          </p:cNvPr>
+          <p:cNvSpPr>
+            <a:spLocks noGrp="1"/>
+          </p:cNvSpPr>
+          <p:nvPr>
+            <p:ph idx="1"/>
+          </p:nvPr>
+        </p:nvSpPr>
+        <p:spPr/>
+        <p:txBody>
+          <a:bodyPr/>
+          <a:lstStyle/>
+          <a:p>
+            <a:r>
+              <a:rPr lang="pt-BR" dirty="0"/>
+              <a:t>Façam os Exercícios das Páginas 96 e 97 do livro </a:t>
+            </a:r>
+            <a:r>
+              <a:rPr lang="pt-PT" dirty="0"/>
+              <a:t>(AHO, 1995)</a:t>
+            </a:r>
+            <a:endParaRPr lang="pt-BR" dirty="0"/>
+          </a:p>
+        </p:txBody>
+      </p:sp>
+      <p:sp>
+        <p:nvSpPr>
+          <p:cNvPr id="4" name="Espaço Reservado para Data 3">
+            <a:extLst>
+              <a:ext uri="{FF2B5EF4-FFF2-40B4-BE49-F238E27FC236}">
+                <a16:creationId xmlns:a16="http://schemas.microsoft.com/office/drawing/2014/main" id="{C039731F-BC76-1041-B1D7-C9172A349906}"/>
+              </a:ext>
+            </a:extLst>
+          </p:cNvPr>
+          <p:cNvSpPr>
+            <a:spLocks noGrp="1"/>
+          </p:cNvSpPr>
+          <p:nvPr>
+            <p:ph type="dt" sz="half" idx="10"/>
+          </p:nvPr>
+        </p:nvSpPr>
+        <p:spPr/>
+        <p:txBody>
+          <a:bodyPr/>
+          <a:lstStyle/>
+          <a:p>
+            <a:r>
+              <a:rPr lang="pt-BR"/>
+              <a:t>Compiladores</a:t>
+            </a:r>
+            <a:endParaRPr lang="pt-BR" dirty="0"/>
+          </a:p>
+        </p:txBody>
+      </p:sp>
+      <p:sp>
+        <p:nvSpPr>
+          <p:cNvPr id="5" name="Espaço Reservado para Rodapé 4">
+            <a:extLst>
+              <a:ext uri="{FF2B5EF4-FFF2-40B4-BE49-F238E27FC236}">
+                <a16:creationId xmlns:a16="http://schemas.microsoft.com/office/drawing/2014/main" id="{C65FB5BD-0320-8943-94BF-C5529A652215}"/>
+              </a:ext>
+            </a:extLst>
+          </p:cNvPr>
+          <p:cNvSpPr>
+            <a:spLocks noGrp="1"/>
+          </p:cNvSpPr>
+          <p:nvPr>
+            <p:ph type="ftr" sz="quarter" idx="11"/>
+          </p:nvPr>
+        </p:nvSpPr>
+        <p:spPr/>
+        <p:txBody>
+          <a:bodyPr/>
+          <a:lstStyle/>
+          <a:p>
+            <a:r>
+              <a:rPr lang="pt-BR"/>
+              <a:t>Prof. Mathias Santos de Brito</a:t>
+            </a:r>
+            <a:endParaRPr lang="pt-BR" dirty="0"/>
+          </a:p>
+        </p:txBody>
+      </p:sp>
+      <p:sp>
+        <p:nvSpPr>
+          <p:cNvPr id="6" name="Espaço Reservado para Número de Slide 5">
+            <a:extLst>
+              <a:ext uri="{FF2B5EF4-FFF2-40B4-BE49-F238E27FC236}">
+                <a16:creationId xmlns:a16="http://schemas.microsoft.com/office/drawing/2014/main" id="{5BF64264-A31F-744F-988F-6B376315C5F4}"/>
+              </a:ext>
+            </a:extLst>
+          </p:cNvPr>
+          <p:cNvSpPr>
+            <a:spLocks noGrp="1"/>
+          </p:cNvSpPr>
+          <p:nvPr>
+            <p:ph type="sldNum" sz="quarter" idx="12"/>
+          </p:nvPr>
+        </p:nvSpPr>
+        <p:spPr/>
+        <p:txBody>
+          <a:bodyPr/>
+          <a:lstStyle/>
+          <a:p>
+            <a:fld id="{BB6592E8-4CB6-CA48-8DDA-14B9D6C8BDBF}" type="slidenum">
+              <a:rPr lang="pt-BR" smtClean="0"/>
+              <a:t>54</a:t>
+            </a:fld>
+            <a:endParaRPr lang="pt-BR"/>
+          </a:p>
+        </p:txBody>
+      </p:sp>
+    </p:spTree>
+    <p:extLst>
+      <p:ext uri="{BB962C8B-B14F-4D97-AF65-F5344CB8AC3E}">
+        <p14:creationId xmlns:p14="http://schemas.microsoft.com/office/powerpoint/2010/main" val="1102517218"/>
+      </p:ext>
+    </p:extLst>
+  </p:cSld>
+  <p:clrMapOvr>
+    <a:masterClrMapping/>
+  </p:clrMapOvr>
+</p:sld>
+</file>
+
 <file path=ppt/slides/slide6.xml><?xml version="1.0" encoding="utf-8"?>
 <p:sld xmlns:a="http://schemas.openxmlformats.org/drawingml/2006/main" xmlns:r="http://schemas.openxmlformats.org/officeDocument/2006/relationships" xmlns:p="http://schemas.openxmlformats.org/presentationml/2006/main">
   <p:cSld>

</xml_diff>